<commit_message>
Added the final presentation
</commit_message>
<xml_diff>
--- a/OTC DevOps Challenge Final.pptx
+++ b/OTC DevOps Challenge Final.pptx
@@ -113,6 +113,11 @@
       </a:defRPr>
     </a:lvl9pPr>
   </p:defaultTextStyle>
+  <p:extLst>
+    <p:ext uri="{EFAFB233-063F-42B5-8137-9DF3F51BA10A}">
+      <p15:sldGuideLst xmlns:p15="http://schemas.microsoft.com/office/powerpoint/2012/main"/>
+    </p:ext>
+  </p:extLst>
 </p:presentation>
 </file>
 
@@ -263,7 +268,7 @@
           <a:p>
             <a:fld id="{97367D18-16CE-4DE7-9C59-DA4FE0151DE1}" type="datetimeFigureOut">
               <a:rPr lang="en-US" smtClean="0"/>
-              <a:t>1/15/2019</a:t>
+              <a:t>1/16/2019</a:t>
             </a:fld>
             <a:endParaRPr lang="en-US"/>
           </a:p>
@@ -461,7 +466,7 @@
           <a:p>
             <a:fld id="{97367D18-16CE-4DE7-9C59-DA4FE0151DE1}" type="datetimeFigureOut">
               <a:rPr lang="en-US" smtClean="0"/>
-              <a:t>1/15/2019</a:t>
+              <a:t>1/16/2019</a:t>
             </a:fld>
             <a:endParaRPr lang="en-US"/>
           </a:p>
@@ -669,7 +674,7 @@
           <a:p>
             <a:fld id="{97367D18-16CE-4DE7-9C59-DA4FE0151DE1}" type="datetimeFigureOut">
               <a:rPr lang="en-US" smtClean="0"/>
-              <a:t>1/15/2019</a:t>
+              <a:t>1/16/2019</a:t>
             </a:fld>
             <a:endParaRPr lang="en-US"/>
           </a:p>
@@ -867,7 +872,7 @@
           <a:p>
             <a:fld id="{97367D18-16CE-4DE7-9C59-DA4FE0151DE1}" type="datetimeFigureOut">
               <a:rPr lang="en-US" smtClean="0"/>
-              <a:t>1/15/2019</a:t>
+              <a:t>1/16/2019</a:t>
             </a:fld>
             <a:endParaRPr lang="en-US"/>
           </a:p>
@@ -1142,7 +1147,7 @@
           <a:p>
             <a:fld id="{97367D18-16CE-4DE7-9C59-DA4FE0151DE1}" type="datetimeFigureOut">
               <a:rPr lang="en-US" smtClean="0"/>
-              <a:t>1/15/2019</a:t>
+              <a:t>1/16/2019</a:t>
             </a:fld>
             <a:endParaRPr lang="en-US"/>
           </a:p>
@@ -1407,7 +1412,7 @@
           <a:p>
             <a:fld id="{97367D18-16CE-4DE7-9C59-DA4FE0151DE1}" type="datetimeFigureOut">
               <a:rPr lang="en-US" smtClean="0"/>
-              <a:t>1/15/2019</a:t>
+              <a:t>1/16/2019</a:t>
             </a:fld>
             <a:endParaRPr lang="en-US"/>
           </a:p>
@@ -1819,7 +1824,7 @@
           <a:p>
             <a:fld id="{97367D18-16CE-4DE7-9C59-DA4FE0151DE1}" type="datetimeFigureOut">
               <a:rPr lang="en-US" smtClean="0"/>
-              <a:t>1/15/2019</a:t>
+              <a:t>1/16/2019</a:t>
             </a:fld>
             <a:endParaRPr lang="en-US"/>
           </a:p>
@@ -1960,7 +1965,7 @@
           <a:p>
             <a:fld id="{97367D18-16CE-4DE7-9C59-DA4FE0151DE1}" type="datetimeFigureOut">
               <a:rPr lang="en-US" smtClean="0"/>
-              <a:t>1/15/2019</a:t>
+              <a:t>1/16/2019</a:t>
             </a:fld>
             <a:endParaRPr lang="en-US"/>
           </a:p>
@@ -2073,7 +2078,7 @@
           <a:p>
             <a:fld id="{97367D18-16CE-4DE7-9C59-DA4FE0151DE1}" type="datetimeFigureOut">
               <a:rPr lang="en-US" smtClean="0"/>
-              <a:t>1/15/2019</a:t>
+              <a:t>1/16/2019</a:t>
             </a:fld>
             <a:endParaRPr lang="en-US"/>
           </a:p>
@@ -2384,7 +2389,7 @@
           <a:p>
             <a:fld id="{97367D18-16CE-4DE7-9C59-DA4FE0151DE1}" type="datetimeFigureOut">
               <a:rPr lang="en-US" smtClean="0"/>
-              <a:t>1/15/2019</a:t>
+              <a:t>1/16/2019</a:t>
             </a:fld>
             <a:endParaRPr lang="en-US"/>
           </a:p>
@@ -2672,7 +2677,7 @@
           <a:p>
             <a:fld id="{97367D18-16CE-4DE7-9C59-DA4FE0151DE1}" type="datetimeFigureOut">
               <a:rPr lang="en-US" smtClean="0"/>
-              <a:t>1/15/2019</a:t>
+              <a:t>1/16/2019</a:t>
             </a:fld>
             <a:endParaRPr lang="en-US"/>
           </a:p>
@@ -2913,7 +2918,7 @@
           <a:p>
             <a:fld id="{97367D18-16CE-4DE7-9C59-DA4FE0151DE1}" type="datetimeFigureOut">
               <a:rPr lang="en-US" smtClean="0"/>
-              <a:t>1/15/2019</a:t>
+              <a:t>1/16/2019</a:t>
             </a:fld>
             <a:endParaRPr lang="en-US"/>
           </a:p>
@@ -5695,7 +5700,7 @@
         </p:nvSpPr>
         <p:spPr>
           <a:xfrm>
-            <a:off x="533400" y="175828"/>
+            <a:off x="471854" y="-180975"/>
             <a:ext cx="10515600" cy="1325563"/>
           </a:xfrm>
         </p:spPr>
@@ -5742,10 +5747,10 @@
       </p:sp>
       <p:pic>
         <p:nvPicPr>
-          <p:cNvPr id="12" name="Picture 11">
-            <a:extLst>
-              <a:ext uri="{FF2B5EF4-FFF2-40B4-BE49-F238E27FC236}">
-                <a16:creationId xmlns:a16="http://schemas.microsoft.com/office/drawing/2014/main" id="{19A4DE66-BA11-4255-BA29-5FA6387B6065}"/>
+          <p:cNvPr id="3" name="Picture 2">
+            <a:extLst>
+              <a:ext uri="{FF2B5EF4-FFF2-40B4-BE49-F238E27FC236}">
+                <a16:creationId xmlns:a16="http://schemas.microsoft.com/office/drawing/2014/main" id="{4325B22E-ABE7-43D8-837E-937A59257636}"/>
               </a:ext>
             </a:extLst>
           </p:cNvPr>
@@ -5762,8 +5767,8 @@
         </p:blipFill>
         <p:spPr>
           <a:xfrm>
-            <a:off x="174927" y="1030014"/>
-            <a:ext cx="11842146" cy="5827986"/>
+            <a:off x="220858" y="764931"/>
+            <a:ext cx="11750284" cy="6093068"/>
           </a:xfrm>
           <a:prstGeom prst="rect">
             <a:avLst/>

</xml_diff>